<commit_message>
Added lesson 01 and fixed transitions in introduction.
</commit_message>
<xml_diff>
--- a/Presentations/PPC_Introduction.pptx
+++ b/Presentations/PPC_Introduction.pptx
@@ -109,6 +109,11 @@
       </a:defRPr>
     </a:lvl9pPr>
   </p:defaultTextStyle>
+  <p:extLst>
+    <p:ext uri="{EFAFB233-063F-42B5-8137-9DF3F51BA10A}">
+      <p15:sldGuideLst xmlns:p15="http://schemas.microsoft.com/office/powerpoint/2012/main"/>
+    </p:ext>
+  </p:extLst>
 </p:presentation>
 </file>
 
@@ -3101,6 +3106,21 @@
   <p:clrMapOvr>
     <a:masterClrMapping/>
   </p:clrMapOvr>
+  <mc:AlternateContent xmlns:mc="http://schemas.openxmlformats.org/markup-compatibility/2006">
+    <mc:Choice xmlns:p14="http://schemas.microsoft.com/office/powerpoint/2010/main" Requires="p14">
+      <p:transition p14:dur="0"/>
+    </mc:Choice>
+    <mc:Fallback>
+      <p:transition/>
+    </mc:Fallback>
+  </mc:AlternateContent>
+  <p:timing>
+    <p:tnLst>
+      <p:par>
+        <p:cTn id="1" dur="indefinite" restart="never" nodeType="tmRoot"/>
+      </p:par>
+    </p:tnLst>
+  </p:timing>
 </p:sld>
 </file>
 
@@ -3230,6 +3250,16 @@
   <p:clrMapOvr>
     <a:masterClrMapping/>
   </p:clrMapOvr>
+  <p:transition spd="slow">
+    <p:push dir="u"/>
+  </p:transition>
+  <p:timing>
+    <p:tnLst>
+      <p:par>
+        <p:cTn id="1" dur="indefinite" restart="never" nodeType="tmRoot"/>
+      </p:par>
+    </p:tnLst>
+  </p:timing>
 </p:sld>
 </file>
 
@@ -3384,6 +3414,9 @@
   <p:clrMapOvr>
     <a:masterClrMapping/>
   </p:clrMapOvr>
+  <p:transition spd="slow">
+    <p:push dir="u"/>
+  </p:transition>
 </p:sld>
 </file>
 
@@ -3529,6 +3562,9 @@
   <p:clrMapOvr>
     <a:masterClrMapping/>
   </p:clrMapOvr>
+  <p:transition spd="slow">
+    <p:push dir="u"/>
+  </p:transition>
 </p:sld>
 </file>
 
@@ -3813,6 +3849,9 @@
   <p:clrMapOvr>
     <a:masterClrMapping/>
   </p:clrMapOvr>
+  <p:transition spd="slow">
+    <p:push dir="u"/>
+  </p:transition>
 </p:sld>
 </file>
 
@@ -4064,6 +4103,9 @@
   <p:clrMapOvr>
     <a:masterClrMapping/>
   </p:clrMapOvr>
+  <p:transition spd="slow">
+    <p:push dir="u"/>
+  </p:transition>
 </p:sld>
 </file>
 

</xml_diff>